<commit_message>
Added Project in Indian Servers TITLE:FINEFUNING TUNING LLAMA2
</commit_message>
<xml_diff>
--- a/IBM-EduSkills/Internship Project Submission PPT.pptx
+++ b/IBM-EduSkills/Internship Project Submission PPT.pptx
@@ -393,7 +393,7 @@
           <a:p>
             <a:fld id="{46256A78-79A6-408F-8148-4F87BB81602D}" type="datetimeFigureOut">
               <a:rPr lang="en-IN" smtClean="0"/>
-              <a:t>26-09-2023</a:t>
+              <a:t>29-09-2023</a:t>
             </a:fld>
             <a:endParaRPr lang="en-IN"/>
           </a:p>
@@ -1469,7 +1469,7 @@
           <a:p>
             <a:fld id="{ED291B17-9318-49DB-B28B-6E5994AE9581}" type="datetime1">
               <a:rPr lang="en-US" smtClean="0"/>
-              <a:t>9/26/2023</a:t>
+              <a:t>9/29/2023</a:t>
             </a:fld>
             <a:endParaRPr lang="en-US"/>
           </a:p>
@@ -1720,7 +1720,7 @@
           <a:p>
             <a:fld id="{ED291B17-9318-49DB-B28B-6E5994AE9581}" type="datetime1">
               <a:rPr lang="en-US" smtClean="0"/>
-              <a:t>9/26/2023</a:t>
+              <a:t>9/29/2023</a:t>
             </a:fld>
             <a:endParaRPr lang="en-US"/>
           </a:p>
@@ -2035,7 +2035,7 @@
           <a:p>
             <a:fld id="{ED291B17-9318-49DB-B28B-6E5994AE9581}" type="datetime1">
               <a:rPr lang="en-US" smtClean="0"/>
-              <a:t>9/26/2023</a:t>
+              <a:t>9/29/2023</a:t>
             </a:fld>
             <a:endParaRPr lang="en-US"/>
           </a:p>
@@ -2363,7 +2363,7 @@
           <a:p>
             <a:fld id="{ED291B17-9318-49DB-B28B-6E5994AE9581}" type="datetime1">
               <a:rPr lang="en-US" smtClean="0"/>
-              <a:t>9/26/2023</a:t>
+              <a:t>9/29/2023</a:t>
             </a:fld>
             <a:endParaRPr lang="en-US"/>
           </a:p>
@@ -2678,7 +2678,7 @@
           <a:p>
             <a:fld id="{ED291B17-9318-49DB-B28B-6E5994AE9581}" type="datetime1">
               <a:rPr lang="en-US" smtClean="0"/>
-              <a:t>9/26/2023</a:t>
+              <a:t>9/29/2023</a:t>
             </a:fld>
             <a:endParaRPr lang="en-US"/>
           </a:p>
@@ -3066,7 +3066,7 @@
           <a:p>
             <a:fld id="{ED291B17-9318-49DB-B28B-6E5994AE9581}" type="datetime1">
               <a:rPr lang="en-US" smtClean="0"/>
-              <a:t>9/26/2023</a:t>
+              <a:t>9/29/2023</a:t>
             </a:fld>
             <a:endParaRPr lang="en-US"/>
           </a:p>
@@ -3237,7 +3237,7 @@
           <a:p>
             <a:fld id="{ED291B17-9318-49DB-B28B-6E5994AE9581}" type="datetime1">
               <a:rPr lang="en-US" smtClean="0"/>
-              <a:t>9/26/2023</a:t>
+              <a:t>9/29/2023</a:t>
             </a:fld>
             <a:endParaRPr lang="en-US"/>
           </a:p>
@@ -3418,7 +3418,7 @@
           <a:p>
             <a:fld id="{ED291B17-9318-49DB-B28B-6E5994AE9581}" type="datetime1">
               <a:rPr lang="en-US" smtClean="0"/>
-              <a:t>9/26/2023</a:t>
+              <a:t>9/29/2023</a:t>
             </a:fld>
             <a:endParaRPr lang="en-US"/>
           </a:p>
@@ -3595,7 +3595,7 @@
           <a:p>
             <a:fld id="{ED291B17-9318-49DB-B28B-6E5994AE9581}" type="datetime1">
               <a:rPr lang="en-US" smtClean="0"/>
-              <a:t>9/26/2023</a:t>
+              <a:t>9/29/2023</a:t>
             </a:fld>
             <a:endParaRPr lang="en-US"/>
           </a:p>
@@ -3843,7 +3843,7 @@
           <a:p>
             <a:fld id="{B2497495-0637-405E-AE64-5CC7506D51F5}" type="datetime1">
               <a:rPr lang="en-US" smtClean="0"/>
-              <a:t>9/26/2023</a:t>
+              <a:t>9/29/2023</a:t>
             </a:fld>
             <a:endParaRPr lang="en-US"/>
           </a:p>
@@ -4075,7 +4075,7 @@
           <a:p>
             <a:fld id="{ED291B17-9318-49DB-B28B-6E5994AE9581}" type="datetime1">
               <a:rPr lang="en-US" smtClean="0"/>
-              <a:t>9/26/2023</a:t>
+              <a:t>9/29/2023</a:t>
             </a:fld>
             <a:endParaRPr lang="en-US"/>
           </a:p>
@@ -4450,7 +4450,7 @@
           <a:p>
             <a:fld id="{ED291B17-9318-49DB-B28B-6E5994AE9581}" type="datetime1">
               <a:rPr lang="en-US" smtClean="0"/>
-              <a:t>9/26/2023</a:t>
+              <a:t>9/29/2023</a:t>
             </a:fld>
             <a:endParaRPr lang="en-US"/>
           </a:p>
@@ -4574,7 +4574,7 @@
           <a:p>
             <a:fld id="{5DB4ED54-5B5E-4A04-93D3-5772E3CE3818}" type="datetime1">
               <a:rPr lang="en-US" smtClean="0"/>
-              <a:t>9/26/2023</a:t>
+              <a:t>9/29/2023</a:t>
             </a:fld>
             <a:endParaRPr lang="en-US"/>
           </a:p>
@@ -4669,7 +4669,7 @@
           <a:p>
             <a:fld id="{4EDE50D6-574B-40AF-946F-D52A04ADE379}" type="datetime1">
               <a:rPr lang="en-US" smtClean="0"/>
-              <a:t>9/26/2023</a:t>
+              <a:t>9/29/2023</a:t>
             </a:fld>
             <a:endParaRPr lang="en-US"/>
           </a:p>
@@ -4924,7 +4924,7 @@
           <a:p>
             <a:fld id="{ED291B17-9318-49DB-B28B-6E5994AE9581}" type="datetime1">
               <a:rPr lang="en-US" smtClean="0"/>
-              <a:t>9/26/2023</a:t>
+              <a:t>9/29/2023</a:t>
             </a:fld>
             <a:endParaRPr lang="en-US"/>
           </a:p>
@@ -5188,7 +5188,7 @@
           <a:p>
             <a:fld id="{7E18DB4A-8810-4A10-AD5C-D5E2C667F5B3}" type="datetime1">
               <a:rPr lang="en-US" smtClean="0"/>
-              <a:t>9/26/2023</a:t>
+              <a:t>9/29/2023</a:t>
             </a:fld>
             <a:endParaRPr lang="en-US"/>
           </a:p>
@@ -5934,7 +5934,7 @@
           <a:p>
             <a:fld id="{ED291B17-9318-49DB-B28B-6E5994AE9581}" type="datetime1">
               <a:rPr lang="en-US" smtClean="0"/>
-              <a:t>9/26/2023</a:t>
+              <a:t>9/29/2023</a:t>
             </a:fld>
             <a:endParaRPr lang="en-US"/>
           </a:p>
@@ -8691,13 +8691,13 @@
         </p:spPr>
         <p:txBody>
           <a:bodyPr>
-            <a:normAutofit fontScale="90000"/>
+            <a:normAutofit/>
           </a:bodyPr>
           <a:lstStyle/>
           <a:p>
             <a:r>
-              <a:rPr lang="en-US" sz="3600" dirty="0"/>
-              <a:t>WHO ARE THE END USERS of this project?</a:t>
+              <a:rPr lang="en-US" dirty="0"/>
+              <a:t> </a:t>
             </a:r>
             <a:endParaRPr lang="en-IN" dirty="0"/>
           </a:p>
@@ -9979,6 +9979,15 @@
 </file>
 
 <file path=customXml/item2.xml><?xml version="1.0" encoding="utf-8"?>
+<?mso-contentType ?>
+<FormTemplates xmlns="http://schemas.microsoft.com/sharepoint/v3/contenttype/forms">
+  <Display>DocumentLibraryForm</Display>
+  <Edit>DocumentLibraryForm</Edit>
+  <New>DocumentLibraryForm</New>
+</FormTemplates>
+</file>
+
+<file path=customXml/item3.xml><?xml version="1.0" encoding="utf-8"?>
 <ct:contentTypeSchema xmlns:ct="http://schemas.microsoft.com/office/2006/metadata/contentType" xmlns:ma="http://schemas.microsoft.com/office/2006/metadata/properties/metaAttributes" ct:_="" ma:_="" ma:contentTypeName="Document" ma:contentTypeID="0x01010079F111ED35F8CC479449609E8A0923A6" ma:contentTypeVersion="12" ma:contentTypeDescription="Create a new document." ma:contentTypeScope="" ma:versionID="a410dd7f93c95333ffa1b60ed6adedd1">
   <xsd:schema xmlns:xsd="http://www.w3.org/2001/XMLSchema" xmlns:xs="http://www.w3.org/2001/XMLSchema" xmlns:p="http://schemas.microsoft.com/office/2006/metadata/properties" xmlns:ns2="71af3243-3dd4-4a8d-8c0d-dd76da1f02a5" xmlns:ns3="16c05727-aa75-4e4a-9b5f-8a80a1165891" targetNamespace="http://schemas.microsoft.com/office/2006/metadata/properties" ma:root="true" ma:fieldsID="a936d9baba76aa3866493feff160faab" ns2:_="" ns3:_="">
     <xsd:import namespace="71af3243-3dd4-4a8d-8c0d-dd76da1f02a5"/>
@@ -10199,15 +10208,6 @@
 </ct:contentTypeSchema>
 </file>
 
-<file path=customXml/item3.xml><?xml version="1.0" encoding="utf-8"?>
-<?mso-contentType ?>
-<FormTemplates xmlns="http://schemas.microsoft.com/sharepoint/v3/contenttype/forms">
-  <Display>DocumentLibraryForm</Display>
-  <Edit>DocumentLibraryForm</Edit>
-  <New>DocumentLibraryForm</New>
-</FormTemplates>
-</file>
-
 <file path=customXml/itemProps1.xml><?xml version="1.0" encoding="utf-8"?>
 <ds:datastoreItem xmlns:ds="http://schemas.openxmlformats.org/officeDocument/2006/customXml" ds:itemID="{8D289AE2-D2AE-49D1-AFAC-3A79F6794255}">
   <ds:schemaRefs>
@@ -10226,6 +10226,14 @@
 </file>
 
 <file path=customXml/itemProps2.xml><?xml version="1.0" encoding="utf-8"?>
+<ds:datastoreItem xmlns:ds="http://schemas.openxmlformats.org/officeDocument/2006/customXml" ds:itemID="{927BD4C1-B6B1-4715-ABF9-E660A51A4EA0}">
+  <ds:schemaRefs>
+    <ds:schemaRef ds:uri="http://schemas.microsoft.com/sharepoint/v3/contenttype/forms"/>
+  </ds:schemaRefs>
+</ds:datastoreItem>
+</file>
+
+<file path=customXml/itemProps3.xml><?xml version="1.0" encoding="utf-8"?>
 <ds:datastoreItem xmlns:ds="http://schemas.openxmlformats.org/officeDocument/2006/customXml" ds:itemID="{41E7CA09-9778-4414-AE97-8064B12DA30E}">
   <ds:schemaRefs>
     <ds:schemaRef ds:uri="16c05727-aa75-4e4a-9b5f-8a80a1165891"/>
@@ -10242,12 +10250,4 @@
     <ds:schemaRef ds:uri="http://www.w3.org/2001/XMLSchema"/>
   </ds:schemaRefs>
 </ds:datastoreItem>
-</file>
-
-<file path=customXml/itemProps3.xml><?xml version="1.0" encoding="utf-8"?>
-<ds:datastoreItem xmlns:ds="http://schemas.openxmlformats.org/officeDocument/2006/customXml" ds:itemID="{927BD4C1-B6B1-4715-ABF9-E660A51A4EA0}">
-  <ds:schemaRefs>
-    <ds:schemaRef ds:uri="http://schemas.microsoft.com/sharepoint/v3/contenttype/forms"/>
-  </ds:schemaRefs>
-</ds:datastoreItem>
 </file>
</xml_diff>